<commit_message>
WOW it is working for now and up to set 4
</commit_message>
<xml_diff>
--- a/docs/lectures/lecture_03/03_01_lecture_powerpoint.pptx
+++ b/docs/lectures/lecture_03/03_01_lecture_powerpoint.pptx
@@ -30,11 +30,6 @@
     <p:sldId id="278" r:id="rId24"/>
     <p:sldId id="279" r:id="rId25"/>
     <p:sldId id="280" r:id="rId26"/>
-    <p:sldId id="281" r:id="rId27"/>
-    <p:sldId id="282" r:id="rId28"/>
-    <p:sldId id="283" r:id="rId29"/>
-    <p:sldId id="284" r:id="rId30"/>
-    <p:sldId id="285" r:id="rId31"/>
   </p:sldIdLst>
   <p:sldSz cx="9144000" cy="5143500" type="screen16x9"/>
   <p:notesSz cx="6858000" cy="9144000"/>
@@ -3453,7 +3448,7 @@
             <a:pPr lvl="0"/>
             <a:r>
               <a:rPr/>
-              <a:t>i.e., probability of lenght between 10 and 80 = 1</a:t>
+              <a:t>i.e., probability of length between 10 and 80 = 1</a:t>
             </a:r>
           </a:p>
         </p:txBody>
@@ -3563,7 +3558,28 @@
             </a:pPr>
             <a:r>
               <a:rPr/>
-              <a:t>Now we could look at a lot of different ranges of lengths - probability of the lenght larger than the mean - probability of the lenght larger than 70 mm - probabilioty of the lenght between two numbers</a:t>
+              <a:t>Now we could look at a lot of different ranges of lengths</a:t>
+            </a:r>
+          </a:p>
+          <a:p>
+            <a:pPr lvl="0"/>
+            <a:r>
+              <a:rPr/>
+              <a:t>probability of the length larger than the mean</a:t>
+            </a:r>
+          </a:p>
+          <a:p>
+            <a:pPr lvl="0"/>
+            <a:r>
+              <a:rPr/>
+              <a:t>probability of the length larger than 70 mm</a:t>
+            </a:r>
+          </a:p>
+          <a:p>
+            <a:pPr lvl="0"/>
+            <a:r>
+              <a:rPr/>
+              <a:t>probability of the length between two numbers</a:t>
             </a:r>
           </a:p>
         </p:txBody>
@@ -3678,7 +3694,7 @@
             <a:pPr lvl="0"/>
             <a:r>
               <a:rPr/>
-              <a:t>Can define many distributions; some do reasonable job especially whit continuous varaibles</a:t>
+              <a:t>Can define many distributions; some do reasonable job especially whit continuous variables</a:t>
             </a:r>
           </a:p>
           <a:p>
@@ -3816,146 +3832,144 @@
               </a:p>
               <a:p>
                 <a:pPr lvl="0" indent="0" marL="0">
+                  <a:spcBef>
+                    <a:spcPts val="3000"/>
+                  </a:spcBef>
                   <a:buNone/>
                 </a:pPr>
                 <a14:m>
-                  <m:oMathPara xmlns:m="http://schemas.openxmlformats.org/officeDocument/2006/math">
-                    <m:oMathParaPr>
-                      <m:jc m:val="center"/>
-                    </m:oMathParaPr>
-                    <m:oMath>
-                      <m:r>
-                        <m:t>f</m:t>
-                      </m:r>
-                      <m:d>
-                        <m:dPr>
-                          <m:begChr m:val="("/>
-                          <m:endChr m:val=")"/>
-                          <m:sepChr m:val=""/>
-                          <m:grow/>
-                        </m:dPr>
-                        <m:e>
-                          <m:r>
-                            <m:t>y</m:t>
-                          </m:r>
-                        </m:e>
-                      </m:d>
-                      <m:r>
-                        <m:rPr>
-                          <m:sty m:val="p"/>
-                        </m:rPr>
-                        <m:t>=</m:t>
-                      </m:r>
-                      <m:f>
-                        <m:fPr>
-                          <m:type m:val="bar"/>
-                        </m:fPr>
-                        <m:num>
-                          <m:r>
-                            <m:t>1</m:t>
-                          </m:r>
-                        </m:num>
-                        <m:den>
-                          <m:rad>
-                            <m:radPr>
-                              <m:degHide m:val="on"/>
-                            </m:radPr>
-                            <m:deg/>
-                            <m:e>
-                              <m:r>
-                                <m:t>2</m:t>
-                              </m:r>
-                              <m:r>
-                                <m:t>π</m:t>
-                              </m:r>
-                              <m:sSup>
-                                <m:e>
-                                  <m:r>
-                                    <m:t>σ</m:t>
-                                  </m:r>
-                                </m:e>
-                                <m:sup>
-                                  <m:r>
-                                    <m:t>2</m:t>
-                                  </m:r>
-                                </m:sup>
-                              </m:sSup>
-                            </m:e>
-                          </m:rad>
-                        </m:den>
-                      </m:f>
-                      <m:sSup>
-                        <m:e>
-                          <m:r>
-                            <m:t>e</m:t>
-                          </m:r>
-                        </m:e>
-                        <m:sup>
-                          <m:r>
-                            <m:rPr>
-                              <m:sty m:val="p"/>
-                            </m:rPr>
-                            <m:t>−</m:t>
-                          </m:r>
-                          <m:f>
-                            <m:fPr>
-                              <m:type m:val="bar"/>
-                            </m:fPr>
-                            <m:num>
-                              <m:sSup>
-                                <m:e>
-                                  <m:d>
-                                    <m:dPr>
-                                      <m:begChr m:val="("/>
-                                      <m:endChr m:val=")"/>
-                                      <m:sepChr m:val=""/>
-                                      <m:grow/>
-                                    </m:dPr>
-                                    <m:e>
-                                      <m:r>
-                                        <m:t>y</m:t>
-                                      </m:r>
-                                      <m:r>
-                                        <m:rPr>
-                                          <m:sty m:val="p"/>
-                                        </m:rPr>
-                                        <m:t>−</m:t>
-                                      </m:r>
-                                      <m:r>
-                                        <m:t>μ</m:t>
-                                      </m:r>
-                                    </m:e>
-                                  </m:d>
-                                </m:e>
-                                <m:sup>
-                                  <m:r>
-                                    <m:t>2</m:t>
-                                  </m:r>
-                                </m:sup>
-                              </m:sSup>
-                            </m:num>
-                            <m:den>
-                              <m:r>
-                                <m:t>2</m:t>
-                              </m:r>
-                              <m:sSup>
-                                <m:e>
-                                  <m:r>
-                                    <m:t>σ</m:t>
-                                  </m:r>
-                                </m:e>
-                                <m:sup>
-                                  <m:r>
-                                    <m:t>2</m:t>
-                                  </m:r>
-                                </m:sup>
-                              </m:sSup>
-                            </m:den>
-                          </m:f>
-                        </m:sup>
-                      </m:sSup>
-                    </m:oMath>
-                  </m:oMathPara>
+                  <m:oMath xmlns:m="http://schemas.openxmlformats.org/officeDocument/2006/math">
+                    <m:r>
+                      <m:t>f</m:t>
+                    </m:r>
+                    <m:d>
+                      <m:dPr>
+                        <m:begChr m:val="("/>
+                        <m:endChr m:val=")"/>
+                        <m:sepChr m:val=""/>
+                        <m:grow/>
+                      </m:dPr>
+                      <m:e>
+                        <m:r>
+                          <m:t>y</m:t>
+                        </m:r>
+                      </m:e>
+                    </m:d>
+                    <m:r>
+                      <m:rPr>
+                        <m:sty m:val="p"/>
+                      </m:rPr>
+                      <m:t>=</m:t>
+                    </m:r>
+                    <m:f>
+                      <m:fPr>
+                        <m:type m:val="bar"/>
+                      </m:fPr>
+                      <m:num>
+                        <m:r>
+                          <m:t>1</m:t>
+                        </m:r>
+                      </m:num>
+                      <m:den>
+                        <m:rad>
+                          <m:radPr>
+                            <m:degHide m:val="on"/>
+                          </m:radPr>
+                          <m:deg/>
+                          <m:e>
+                            <m:r>
+                              <m:t>2</m:t>
+                            </m:r>
+                            <m:r>
+                              <m:t>π</m:t>
+                            </m:r>
+                            <m:sSup>
+                              <m:e>
+                                <m:r>
+                                  <m:t>σ</m:t>
+                                </m:r>
+                              </m:e>
+                              <m:sup>
+                                <m:r>
+                                  <m:t>2</m:t>
+                                </m:r>
+                              </m:sup>
+                            </m:sSup>
+                          </m:e>
+                        </m:rad>
+                      </m:den>
+                    </m:f>
+                    <m:sSup>
+                      <m:e>
+                        <m:r>
+                          <m:t>e</m:t>
+                        </m:r>
+                      </m:e>
+                      <m:sup>
+                        <m:r>
+                          <m:rPr>
+                            <m:sty m:val="p"/>
+                          </m:rPr>
+                          <m:t>−</m:t>
+                        </m:r>
+                        <m:f>
+                          <m:fPr>
+                            <m:type m:val="bar"/>
+                          </m:fPr>
+                          <m:num>
+                            <m:sSup>
+                              <m:e>
+                                <m:d>
+                                  <m:dPr>
+                                    <m:begChr m:val="("/>
+                                    <m:endChr m:val=")"/>
+                                    <m:sepChr m:val=""/>
+                                    <m:grow/>
+                                  </m:dPr>
+                                  <m:e>
+                                    <m:r>
+                                      <m:t>y</m:t>
+                                    </m:r>
+                                    <m:r>
+                                      <m:rPr>
+                                        <m:sty m:val="p"/>
+                                      </m:rPr>
+                                      <m:t>−</m:t>
+                                    </m:r>
+                                    <m:r>
+                                      <m:t>μ</m:t>
+                                    </m:r>
+                                  </m:e>
+                                </m:d>
+                              </m:e>
+                              <m:sup>
+                                <m:r>
+                                  <m:t>2</m:t>
+                                </m:r>
+                              </m:sup>
+                            </m:sSup>
+                          </m:num>
+                          <m:den>
+                            <m:r>
+                              <m:t>2</m:t>
+                            </m:r>
+                            <m:sSup>
+                              <m:e>
+                                <m:r>
+                                  <m:t>σ</m:t>
+                                </m:r>
+                              </m:e>
+                              <m:sup>
+                                <m:r>
+                                  <m:t>2</m:t>
+                                </m:r>
+                              </m:sup>
+                            </m:sSup>
+                          </m:den>
+                        </m:f>
+                      </m:sup>
+                    </m:sSup>
+                  </m:oMath>
                 </a14:m>
               </a:p>
             </p:txBody>
@@ -4067,7 +4081,6 @@
               <a:rPr/>
               <a:t>Lognormal: right-skewed distribution</a:t>
             </a:r>
-            <a:br/>
           </a:p>
           <a:p>
             <a:pPr lvl="0"/>
@@ -4075,7 +4088,6 @@
               <a:rPr/>
               <a:t>Logarithm of random variable is normally distributed</a:t>
             </a:r>
-            <a:br/>
           </a:p>
           <a:p>
             <a:pPr lvl="0"/>
@@ -4227,7 +4239,7 @@
             </a:pPr>
             <a:r>
               <a:rPr b="1"/>
-              <a:t>In large number of trials: approx. normal distribution</a:t>
+              <a:t>In large number of trials: approximately normal distribution</a:t>
             </a:r>
           </a:p>
         </p:txBody>
@@ -4354,7 +4366,15 @@
             <a:pPr lvl="1"/>
             <a:r>
               <a:rPr b="1" i="1"/>
-              <a:t>Taraxacum officinale - common dandelion</a:t>
+              <a:t>Taraxacum officinale</a:t>
+            </a:r>
+            <a:r>
+              <a:rPr/>
+              <a:t> </a:t>
+            </a:r>
+            <a:r>
+              <a:rPr b="1"/>
+              <a:t>- common dandelion</a:t>
             </a:r>
             <a:r>
               <a:rPr/>
@@ -4685,40 +4705,105 @@
           <a:lstStyle/>
           <a:p>
             <a:pPr lvl="0" indent="0" marL="0">
+              <a:spcBef>
+                <a:spcPts val="3000"/>
+              </a:spcBef>
               <a:buNone/>
             </a:pPr>
             <a:r>
-              <a:rPr/>
-              <a:t>asdfadsf</a:t>
-            </a:r>
-          </a:p>
-        </p:txBody>
-      </p:sp>
-      <p:sp>
-        <p:nvSpPr>
-          <p:cNvPr id="4" name="Content Placeholder 3"/>
-          <p:cNvSpPr>
-            <a:spLocks noGrp="1"/>
-          </p:cNvSpPr>
-          <p:nvPr>
-            <p:ph idx="2" sz="half"/>
-          </p:nvPr>
-        </p:nvSpPr>
-        <p:spPr/>
-        <p:txBody>
-          <a:bodyPr/>
-          <a:lstStyle/>
+              <a:rPr b="1"/>
+              <a:t>Inferential statistics:</a:t>
+            </a:r>
+          </a:p>
+          <a:p>
+            <a:pPr lvl="0"/>
+            <a:r>
+              <a:rPr/>
+              <a:t>inference from samples to populations</a:t>
+            </a:r>
+          </a:p>
           <a:p>
             <a:pPr lvl="0" indent="0" marL="0">
+              <a:spcBef>
+                <a:spcPts val="3000"/>
+              </a:spcBef>
               <a:buNone/>
             </a:pPr>
             <a:r>
-              <a:rPr/>
-              <a:t>asdfasdf</a:t>
-            </a:r>
-          </a:p>
-        </p:txBody>
-      </p:sp>
+              <a:rPr b="1"/>
+              <a:t>Statistical population:</a:t>
+            </a:r>
+          </a:p>
+          <a:p>
+            <a:pPr lvl="0"/>
+            <a:r>
+              <a:rPr/>
+              <a:t>All possible observations of interest</a:t>
+            </a:r>
+          </a:p>
+          <a:p>
+            <a:pPr lvl="0"/>
+            <a:r>
+              <a:rPr/>
+              <a:t>Normally: populations too large to census</a:t>
+            </a:r>
+          </a:p>
+          <a:p>
+            <a:pPr lvl="0" indent="0" marL="0">
+              <a:spcBef>
+                <a:spcPts val="3000"/>
+              </a:spcBef>
+              <a:buNone/>
+            </a:pPr>
+            <a:r>
+              <a:rPr b="1"/>
+              <a:t>Populations are defined in time + space</a:t>
+            </a:r>
+          </a:p>
+          <a:p>
+            <a:pPr lvl="0" indent="0" marL="0">
+              <a:spcBef>
+                <a:spcPts val="3000"/>
+              </a:spcBef>
+              <a:buNone/>
+            </a:pPr>
+            <a:r>
+              <a:rPr b="1"/>
+              <a:t>Examples of statistical populations from you research area?</a:t>
+            </a:r>
+          </a:p>
+        </p:txBody>
+      </p:sp>
+      <p:pic>
+        <p:nvPicPr>
+          <p:cNvPr descr="images/clipboard-2526616735.png" id="0" name="Picture 1"/>
+          <p:cNvPicPr>
+            <a:picLocks noGrp="1" noChangeAspect="1"/>
+          </p:cNvPicPr>
+          <p:nvPr/>
+        </p:nvPicPr>
+        <p:blipFill>
+          <a:blip r:embed="rId2"/>
+          <a:stretch>
+            <a:fillRect/>
+          </a:stretch>
+        </p:blipFill>
+        <p:spPr bwMode="auto">
+          <a:xfrm>
+            <a:off x="6121400" y="1117600"/>
+            <a:ext cx="2781300" cy="3568700"/>
+          </a:xfrm>
+          <a:prstGeom prst="rect">
+            <a:avLst/>
+          </a:prstGeom>
+          <a:noFill/>
+          <a:ln w="9525">
+            <a:noFill/>
+            <a:headEnd/>
+            <a:tailEnd/>
+          </a:ln>
+        </p:spPr>
+      </p:pic>
     </p:spTree>
   </p:cSld>
 </p:sld>
@@ -4790,40 +4875,120 @@
           <a:lstStyle/>
           <a:p>
             <a:pPr lvl="0" indent="0" marL="0">
+              <a:spcBef>
+                <a:spcPts val="3000"/>
+              </a:spcBef>
               <a:buNone/>
             </a:pPr>
             <a:r>
-              <a:rPr/>
-              <a:t>asdfadsf</a:t>
-            </a:r>
-          </a:p>
-        </p:txBody>
-      </p:sp>
-      <p:sp>
-        <p:nvSpPr>
-          <p:cNvPr id="4" name="Content Placeholder 3"/>
-          <p:cNvSpPr>
-            <a:spLocks noGrp="1"/>
-          </p:cNvSpPr>
-          <p:nvPr>
-            <p:ph idx="2" sz="half"/>
-          </p:nvPr>
-        </p:nvSpPr>
-        <p:spPr/>
-        <p:txBody>
-          <a:bodyPr/>
-          <a:lstStyle/>
+              <a:rPr b="1"/>
+              <a:t>Key characteristic of sample is</a:t>
+            </a:r>
+          </a:p>
+          <a:p>
+            <a:pPr lvl="0"/>
+            <a:r>
+              <a:rPr/>
+              <a:t>size (n observations; n = sample size)</a:t>
+            </a:r>
+          </a:p>
           <a:p>
             <a:pPr lvl="0" indent="0" marL="0">
+              <a:spcBef>
+                <a:spcPts val="3000"/>
+              </a:spcBef>
               <a:buNone/>
             </a:pPr>
             <a:r>
-              <a:rPr/>
-              <a:t>asdfasdf</a:t>
-            </a:r>
-          </a:p>
-        </p:txBody>
-      </p:sp>
+              <a:rPr b="1"/>
+              <a:t>Characteristics of population - called parameters</a:t>
+            </a:r>
+          </a:p>
+          <a:p>
+            <a:pPr lvl="0"/>
+            <a:r>
+              <a:rPr/>
+              <a:t>Parameters - Greek letters</a:t>
+            </a:r>
+          </a:p>
+          <a:p>
+            <a:pPr lvl="0" indent="0" marL="0">
+              <a:spcBef>
+                <a:spcPts val="3000"/>
+              </a:spcBef>
+              <a:buNone/>
+            </a:pPr>
+            <a:r>
+              <a:rPr b="1"/>
+              <a:t>Characteristics of samples - statistical estimates of parameters</a:t>
+            </a:r>
+          </a:p>
+          <a:p>
+            <a:pPr lvl="0"/>
+            <a:r>
+              <a:rPr/>
+              <a:t>statistics= Latin letters</a:t>
+            </a:r>
+          </a:p>
+          <a:p>
+            <a:pPr lvl="0" indent="0" marL="0">
+              <a:buNone/>
+            </a:pPr>
+            <a:r>
+              <a:rPr b="1"/>
+              <a:t>Random sampling crucial for</a:t>
+            </a:r>
+          </a:p>
+          <a:p>
+            <a:pPr lvl="0" indent="0" marL="0">
+              <a:buNone/>
+            </a:pPr>
+            <a:r>
+              <a:rPr b="1"/>
+              <a:t>sample -&gt; population</a:t>
+            </a:r>
+          </a:p>
+          <a:p>
+            <a:pPr lvl="0" indent="0" marL="0">
+              <a:buNone/>
+            </a:pPr>
+            <a:r>
+              <a:rPr b="1"/>
+              <a:t>inference statistics -&gt; parameters</a:t>
+            </a:r>
+          </a:p>
+        </p:txBody>
+      </p:sp>
+      <p:pic>
+        <p:nvPicPr>
+          <p:cNvPr descr="images/clipboard-536528302.png" id="0" name="Picture 1"/>
+          <p:cNvPicPr>
+            <a:picLocks noGrp="1" noChangeAspect="1"/>
+          </p:cNvPicPr>
+          <p:nvPr/>
+        </p:nvPicPr>
+        <p:blipFill>
+          <a:blip r:embed="rId2"/>
+          <a:stretch>
+            <a:fillRect/>
+          </a:stretch>
+        </p:blipFill>
+        <p:spPr bwMode="auto">
+          <a:xfrm>
+            <a:off x="6121400" y="889000"/>
+            <a:ext cx="2781300" cy="4013200"/>
+          </a:xfrm>
+          <a:prstGeom prst="rect">
+            <a:avLst/>
+          </a:prstGeom>
+          <a:noFill/>
+          <a:ln w="9525">
+            <a:noFill/>
+            <a:headEnd/>
+            <a:tailEnd/>
+          </a:ln>
+        </p:spPr>
+      </p:pic>
     </p:spTree>
   </p:cSld>
 </p:sld>
@@ -5046,466 +5211,6 @@
             </a:pPr>
             <a:r>
               <a:rPr/>
-              <a:t>Lecture 3: Samples and populations</a:t>
-            </a:r>
-          </a:p>
-        </p:txBody>
-      </p:sp>
-      <p:sp>
-        <p:nvSpPr>
-          <p:cNvPr id="3" name="Content Placeholder 2"/>
-          <p:cNvSpPr>
-            <a:spLocks noGrp="1"/>
-          </p:cNvSpPr>
-          <p:nvPr>
-            <p:ph idx="1" sz="half"/>
-          </p:nvPr>
-        </p:nvSpPr>
-        <p:spPr/>
-        <p:txBody>
-          <a:bodyPr/>
-          <a:lstStyle/>
-          <a:p>
-            <a:pPr lvl="0" indent="0" marL="0">
-              <a:buNone/>
-            </a:pPr>
-            <a:r>
-              <a:rPr/>
-              <a:t>asdfadsf</a:t>
-            </a:r>
-          </a:p>
-        </p:txBody>
-      </p:sp>
-      <p:sp>
-        <p:nvSpPr>
-          <p:cNvPr id="4" name="Content Placeholder 3"/>
-          <p:cNvSpPr>
-            <a:spLocks noGrp="1"/>
-          </p:cNvSpPr>
-          <p:nvPr>
-            <p:ph idx="2" sz="half"/>
-          </p:nvPr>
-        </p:nvSpPr>
-        <p:spPr/>
-        <p:txBody>
-          <a:bodyPr/>
-          <a:lstStyle/>
-          <a:p>
-            <a:pPr lvl="0" indent="0" marL="0">
-              <a:buNone/>
-            </a:pPr>
-            <a:r>
-              <a:rPr/>
-              <a:t>asdfasdf</a:t>
-            </a:r>
-          </a:p>
-        </p:txBody>
-      </p:sp>
-    </p:spTree>
-  </p:cSld>
-</p:sld>
-</file>
-
-<file path=ppt/slides/slide21.xml><?xml version="1.0" encoding="utf-8"?>
-<p:sld xmlns:a="http://schemas.openxmlformats.org/drawingml/2006/main" xmlns:r="http://schemas.openxmlformats.org/officeDocument/2006/relationships" xmlns:p="http://schemas.openxmlformats.org/presentationml/2006/main">
-  <p:cSld>
-    <p:spTree>
-      <p:nvGrpSpPr>
-        <p:cNvPr id="1" name=""/>
-        <p:cNvGrpSpPr/>
-        <p:nvPr/>
-      </p:nvGrpSpPr>
-      <p:grpSpPr>
-        <a:xfrm>
-          <a:off x="0" y="0"/>
-          <a:ext cx="0" cy="0"/>
-          <a:chOff x="0" y="0"/>
-          <a:chExt cx="0" cy="0"/>
-        </a:xfrm>
-      </p:grpSpPr>
-      <p:sp>
-        <p:nvSpPr>
-          <p:cNvPr id="2" name="Title 1"/>
-          <p:cNvSpPr>
-            <a:spLocks noGrp="1"/>
-          </p:cNvSpPr>
-          <p:nvPr>
-            <p:ph type="title"/>
-          </p:nvPr>
-        </p:nvSpPr>
-        <p:spPr>
-          <a:xfrm>
-            <a:off x="0" y="0"/>
-            <a:ext cx="9144000" cy="602780"/>
-          </a:xfrm>
-          <a:solidFill>
-            <a:srgbClr val="70121D"/>
-          </a:solidFill>
-        </p:spPr>
-        <p:txBody>
-          <a:bodyPr/>
-          <a:lstStyle/>
-          <a:p>
-            <a:pPr lvl="0" indent="0" marL="0">
-              <a:buNone/>
-            </a:pPr>
-            <a:r>
-              <a:rPr/>
-              <a:t>Lecture 3: Samples and populations</a:t>
-            </a:r>
-          </a:p>
-        </p:txBody>
-      </p:sp>
-      <p:sp>
-        <p:nvSpPr>
-          <p:cNvPr id="3" name="Content Placeholder 2"/>
-          <p:cNvSpPr>
-            <a:spLocks noGrp="1"/>
-          </p:cNvSpPr>
-          <p:nvPr>
-            <p:ph idx="1" sz="half"/>
-          </p:nvPr>
-        </p:nvSpPr>
-        <p:spPr/>
-        <p:txBody>
-          <a:bodyPr/>
-          <a:lstStyle/>
-          <a:p>
-            <a:pPr lvl="0" indent="0" marL="0">
-              <a:spcBef>
-                <a:spcPts val="3000"/>
-              </a:spcBef>
-              <a:buNone/>
-            </a:pPr>
-            <a:r>
-              <a:rPr b="1"/>
-              <a:t>Inferential statistics:</a:t>
-            </a:r>
-          </a:p>
-          <a:p>
-            <a:pPr lvl="0"/>
-            <a:r>
-              <a:rPr/>
-              <a:t>inference from samples to populations</a:t>
-            </a:r>
-          </a:p>
-          <a:p>
-            <a:pPr lvl="0" indent="0" marL="0">
-              <a:spcBef>
-                <a:spcPts val="3000"/>
-              </a:spcBef>
-              <a:buNone/>
-            </a:pPr>
-            <a:r>
-              <a:rPr b="1"/>
-              <a:t>Statistical population:</a:t>
-            </a:r>
-          </a:p>
-          <a:p>
-            <a:pPr lvl="0"/>
-            <a:r>
-              <a:rPr/>
-              <a:t>All possible observations of interest</a:t>
-            </a:r>
-          </a:p>
-          <a:p>
-            <a:pPr lvl="0"/>
-            <a:r>
-              <a:rPr/>
-              <a:t>Normally: populations too large to census</a:t>
-            </a:r>
-          </a:p>
-          <a:p>
-            <a:pPr lvl="0" indent="0" marL="0">
-              <a:spcBef>
-                <a:spcPts val="3000"/>
-              </a:spcBef>
-              <a:buNone/>
-            </a:pPr>
-            <a:r>
-              <a:rPr b="1"/>
-              <a:t>Populations are defined in time + space</a:t>
-            </a:r>
-          </a:p>
-          <a:p>
-            <a:pPr lvl="0" indent="0" marL="0">
-              <a:spcBef>
-                <a:spcPts val="3000"/>
-              </a:spcBef>
-              <a:buNone/>
-            </a:pPr>
-            <a:r>
-              <a:rPr b="1"/>
-              <a:t>Examples of statistical populations from you research area?</a:t>
-            </a:r>
-          </a:p>
-        </p:txBody>
-      </p:sp>
-      <p:pic>
-        <p:nvPicPr>
-          <p:cNvPr descr="images/clipboard-2526616735.png" id="0" name="Picture 1"/>
-          <p:cNvPicPr>
-            <a:picLocks noGrp="1" noChangeAspect="1"/>
-          </p:cNvPicPr>
-          <p:nvPr/>
-        </p:nvPicPr>
-        <p:blipFill>
-          <a:blip r:embed="rId2"/>
-          <a:stretch>
-            <a:fillRect/>
-          </a:stretch>
-        </p:blipFill>
-        <p:spPr bwMode="auto">
-          <a:xfrm>
-            <a:off x="6121400" y="1117600"/>
-            <a:ext cx="2781300" cy="3568700"/>
-          </a:xfrm>
-          <a:prstGeom prst="rect">
-            <a:avLst/>
-          </a:prstGeom>
-          <a:noFill/>
-          <a:ln w="9525">
-            <a:noFill/>
-            <a:headEnd/>
-            <a:tailEnd/>
-          </a:ln>
-        </p:spPr>
-      </p:pic>
-    </p:spTree>
-  </p:cSld>
-</p:sld>
-</file>
-
-<file path=ppt/slides/slide22.xml><?xml version="1.0" encoding="utf-8"?>
-<p:sld xmlns:a="http://schemas.openxmlformats.org/drawingml/2006/main" xmlns:r="http://schemas.openxmlformats.org/officeDocument/2006/relationships" xmlns:p="http://schemas.openxmlformats.org/presentationml/2006/main">
-  <p:cSld>
-    <p:spTree>
-      <p:nvGrpSpPr>
-        <p:cNvPr id="1" name=""/>
-        <p:cNvGrpSpPr/>
-        <p:nvPr/>
-      </p:nvGrpSpPr>
-      <p:grpSpPr>
-        <a:xfrm>
-          <a:off x="0" y="0"/>
-          <a:ext cx="0" cy="0"/>
-          <a:chOff x="0" y="0"/>
-          <a:chExt cx="0" cy="0"/>
-        </a:xfrm>
-      </p:grpSpPr>
-      <p:sp>
-        <p:nvSpPr>
-          <p:cNvPr id="2" name="Title 1"/>
-          <p:cNvSpPr>
-            <a:spLocks noGrp="1"/>
-          </p:cNvSpPr>
-          <p:nvPr>
-            <p:ph type="title"/>
-          </p:nvPr>
-        </p:nvSpPr>
-        <p:spPr>
-          <a:xfrm>
-            <a:off x="0" y="0"/>
-            <a:ext cx="9144000" cy="602780"/>
-          </a:xfrm>
-          <a:solidFill>
-            <a:srgbClr val="70121D"/>
-          </a:solidFill>
-        </p:spPr>
-        <p:txBody>
-          <a:bodyPr/>
-          <a:lstStyle/>
-          <a:p>
-            <a:pPr lvl="0" indent="0" marL="0">
-              <a:buNone/>
-            </a:pPr>
-            <a:r>
-              <a:rPr/>
-              <a:t>Lecture 3: Samples and populations</a:t>
-            </a:r>
-          </a:p>
-        </p:txBody>
-      </p:sp>
-      <p:sp>
-        <p:nvSpPr>
-          <p:cNvPr id="3" name="Content Placeholder 2"/>
-          <p:cNvSpPr>
-            <a:spLocks noGrp="1"/>
-          </p:cNvSpPr>
-          <p:nvPr>
-            <p:ph idx="1" sz="half"/>
-          </p:nvPr>
-        </p:nvSpPr>
-        <p:spPr/>
-        <p:txBody>
-          <a:bodyPr/>
-          <a:lstStyle/>
-          <a:p>
-            <a:pPr lvl="0" indent="0" marL="0">
-              <a:spcBef>
-                <a:spcPts val="3000"/>
-              </a:spcBef>
-              <a:buNone/>
-            </a:pPr>
-            <a:r>
-              <a:rPr b="1"/>
-              <a:t>Key characteristic of sample is</a:t>
-            </a:r>
-          </a:p>
-          <a:p>
-            <a:pPr lvl="0"/>
-            <a:r>
-              <a:rPr/>
-              <a:t>size (n observations; n = sample size)</a:t>
-            </a:r>
-          </a:p>
-          <a:p>
-            <a:pPr lvl="0" indent="0" marL="0">
-              <a:spcBef>
-                <a:spcPts val="3000"/>
-              </a:spcBef>
-              <a:buNone/>
-            </a:pPr>
-            <a:r>
-              <a:rPr b="1"/>
-              <a:t>Characteristics of population - called parameters</a:t>
-            </a:r>
-          </a:p>
-          <a:p>
-            <a:pPr lvl="0"/>
-            <a:r>
-              <a:rPr/>
-              <a:t>Parameters - Greek letters</a:t>
-            </a:r>
-          </a:p>
-          <a:p>
-            <a:pPr lvl="0" indent="0" marL="0">
-              <a:spcBef>
-                <a:spcPts val="3000"/>
-              </a:spcBef>
-              <a:buNone/>
-            </a:pPr>
-            <a:r>
-              <a:rPr b="1"/>
-              <a:t>Characteristics of samples - statistical estimates of parameters</a:t>
-            </a:r>
-          </a:p>
-          <a:p>
-            <a:pPr lvl="0"/>
-            <a:r>
-              <a:rPr/>
-              <a:t>statistics= Latin letters</a:t>
-            </a:r>
-          </a:p>
-          <a:p>
-            <a:pPr lvl="0" indent="0" marL="0">
-              <a:buNone/>
-            </a:pPr>
-            <a:r>
-              <a:rPr b="1"/>
-              <a:t>Random sampling crucial for</a:t>
-            </a:r>
-          </a:p>
-          <a:p>
-            <a:pPr lvl="0" indent="0" marL="0">
-              <a:buNone/>
-            </a:pPr>
-            <a:r>
-              <a:rPr b="1"/>
-              <a:t>sample -&gt; population</a:t>
-            </a:r>
-          </a:p>
-          <a:p>
-            <a:pPr lvl="0" indent="0" marL="0">
-              <a:buNone/>
-            </a:pPr>
-            <a:r>
-              <a:rPr b="1"/>
-              <a:t>inference statistics -&gt; parameters</a:t>
-            </a:r>
-          </a:p>
-        </p:txBody>
-      </p:sp>
-      <p:pic>
-        <p:nvPicPr>
-          <p:cNvPr descr="images/clipboard-536528302.png" id="0" name="Picture 1"/>
-          <p:cNvPicPr>
-            <a:picLocks noGrp="1" noChangeAspect="1"/>
-          </p:cNvPicPr>
-          <p:nvPr/>
-        </p:nvPicPr>
-        <p:blipFill>
-          <a:blip r:embed="rId2"/>
-          <a:stretch>
-            <a:fillRect/>
-          </a:stretch>
-        </p:blipFill>
-        <p:spPr bwMode="auto">
-          <a:xfrm>
-            <a:off x="6121400" y="889000"/>
-            <a:ext cx="2781300" cy="4013200"/>
-          </a:xfrm>
-          <a:prstGeom prst="rect">
-            <a:avLst/>
-          </a:prstGeom>
-          <a:noFill/>
-          <a:ln w="9525">
-            <a:noFill/>
-            <a:headEnd/>
-            <a:tailEnd/>
-          </a:ln>
-        </p:spPr>
-      </p:pic>
-    </p:spTree>
-  </p:cSld>
-</p:sld>
-</file>
-
-<file path=ppt/slides/slide23.xml><?xml version="1.0" encoding="utf-8"?>
-<p:sld xmlns:a="http://schemas.openxmlformats.org/drawingml/2006/main" xmlns:r="http://schemas.openxmlformats.org/officeDocument/2006/relationships" xmlns:p="http://schemas.openxmlformats.org/presentationml/2006/main">
-  <p:cSld>
-    <p:spTree>
-      <p:nvGrpSpPr>
-        <p:cNvPr id="1" name=""/>
-        <p:cNvGrpSpPr/>
-        <p:nvPr/>
-      </p:nvGrpSpPr>
-      <p:grpSpPr>
-        <a:xfrm>
-          <a:off x="0" y="0"/>
-          <a:ext cx="0" cy="0"/>
-          <a:chOff x="0" y="0"/>
-          <a:chExt cx="0" cy="0"/>
-        </a:xfrm>
-      </p:grpSpPr>
-      <p:sp>
-        <p:nvSpPr>
-          <p:cNvPr id="2" name="Title 1"/>
-          <p:cNvSpPr>
-            <a:spLocks noGrp="1"/>
-          </p:cNvSpPr>
-          <p:nvPr>
-            <p:ph type="title"/>
-          </p:nvPr>
-        </p:nvSpPr>
-        <p:spPr>
-          <a:xfrm>
-            <a:off x="0" y="0"/>
-            <a:ext cx="9144000" cy="602780"/>
-          </a:xfrm>
-          <a:solidFill>
-            <a:srgbClr val="70121D"/>
-          </a:solidFill>
-        </p:spPr>
-        <p:txBody>
-          <a:bodyPr/>
-          <a:lstStyle/>
-          <a:p>
-            <a:pPr lvl="0" indent="0" marL="0">
-              <a:buNone/>
-            </a:pPr>
-            <a:r>
-              <a:rPr/>
               <a:t>Lecture 3: Parameters and statistics</a:t>
             </a:r>
           </a:p>
@@ -5561,6 +5266,15 @@
             <p:txBody>
               <a:bodyPr/>
               <a:lstStyle/>
+              <a:p>
+                <a:pPr lvl="0" indent="0" marL="0">
+                  <a:buNone/>
+                </a:pPr>
+                <a:r>
+                  <a:rPr b="1"/>
+                  <a:t>Mean</a:t>
+                </a:r>
+              </a:p>
               <a:p>
                 <a:pPr lvl="0" indent="0" marL="0">
                   <a:spcBef>
@@ -5637,76 +5351,12 @@
               </a:p>
               <a:p>
                 <a:pPr lvl="0" indent="0" marL="0">
-                  <a:spcBef>
-                    <a:spcPts val="3000"/>
-                  </a:spcBef>
                   <a:buNone/>
                 </a:pPr>
                 <a:r>
                   <a:rPr b="1"/>
-                  <a:t>Formula for n odd </a:t>
+                  <a:t>Formula for n odd</a:t>
                 </a:r>
-                <a14:m>
-                  <m:oMath xmlns:m="http://schemas.openxmlformats.org/officeDocument/2006/math">
-                    <m:sSub>
-                      <m:e>
-                        <m:r>
-                          <m:t>Y</m:t>
-                        </m:r>
-                      </m:e>
-                      <m:sub>
-                        <m:d>
-                          <m:dPr>
-                            <m:begChr m:val="("/>
-                            <m:endChr m:val=")"/>
-                            <m:sepChr m:val=""/>
-                            <m:grow/>
-                          </m:dPr>
-                          <m:e>
-                            <m:r>
-                              <m:t>n</m:t>
-                            </m:r>
-                            <m:r>
-                              <m:rPr>
-                                <m:sty m:val="p"/>
-                              </m:rPr>
-                              <m:t>+</m:t>
-                            </m:r>
-                            <m:r>
-                              <m:t>1</m:t>
-                            </m:r>
-                          </m:e>
-                        </m:d>
-                        <m:r>
-                          <m:rPr>
-                            <m:sty m:val="p"/>
-                          </m:rPr>
-                          <m:t>/</m:t>
-                        </m:r>
-                        <m:r>
-                          <m:t>2</m:t>
-                        </m:r>
-                      </m:sub>
-                    </m:sSub>
-                    <m:r>
-                      <m:rPr>
-                        <m:nor/>
-                        <m:sty m:val="p"/>
-                      </m:rPr>
-                      <m:t> if </m:t>
-                    </m:r>
-                    <m:r>
-                      <m:t>n</m:t>
-                    </m:r>
-                    <m:r>
-                      <m:rPr>
-                        <m:nor/>
-                        <m:sty m:val="p"/>
-                      </m:rPr>
-                      <m:t> odd</m:t>
-                    </m:r>
-                  </m:oMath>
-                </a14:m>
               </a:p>
               <a:p>
                 <a:pPr lvl="0" indent="0" marL="0">
@@ -5715,12 +5365,83 @@
                   </a:spcBef>
                   <a:buNone/>
                 </a:pPr>
+                <a14:m>
+                  <m:oMath xmlns:m="http://schemas.openxmlformats.org/officeDocument/2006/math">
+                    <m:r>
+                      <m:rPr>
+                        <m:nor/>
+                        <m:sty m:val="p"/>
+                      </m:rPr>
+                      <m:t>median = </m:t>
+                    </m:r>
+                    <m:r>
+                      <m:t>Y</m:t>
+                    </m:r>
+                    <m:r>
+                      <m:rPr>
+                        <m:sty m:val="p"/>
+                      </m:rPr>
+                      <m:t>_</m:t>
+                    </m:r>
+                    <m:d>
+                      <m:dPr>
+                        <m:begChr m:val="("/>
+                        <m:endChr m:val=")"/>
+                        <m:sepChr m:val=""/>
+                        <m:grow/>
+                      </m:dPr>
+                      <m:e>
+                        <m:r>
+                          <m:t>n</m:t>
+                        </m:r>
+                        <m:r>
+                          <m:rPr>
+                            <m:sty m:val="p"/>
+                          </m:rPr>
+                          <m:t>+</m:t>
+                        </m:r>
+                        <m:r>
+                          <m:t>1</m:t>
+                        </m:r>
+                      </m:e>
+                    </m:d>
+                    <m:r>
+                      <m:rPr>
+                        <m:sty m:val="p"/>
+                      </m:rPr>
+                      <m:t>/</m:t>
+                    </m:r>
+                    <m:r>
+                      <m:t>2</m:t>
+                    </m:r>
+                  </m:oMath>
+                </a14:m>
+              </a:p>
+              <a:p>
+                <a:pPr lvl="0" indent="0" marL="0">
+                  <a:buNone/>
+                </a:pPr>
                 <a:r>
                   <a:rPr b="1"/>
-                  <a:t>Formula for n even </a:t>
+                  <a:t>Formula for n even</a:t>
                 </a:r>
+              </a:p>
+              <a:p>
+                <a:pPr lvl="0" indent="0" marL="0">
+                  <a:spcBef>
+                    <a:spcPts val="3000"/>
+                  </a:spcBef>
+                  <a:buNone/>
+                </a:pPr>
                 <a14:m>
                   <m:oMath xmlns:m="http://schemas.openxmlformats.org/officeDocument/2006/math">
+                    <m:r>
+                      <m:rPr>
+                        <m:nor/>
+                        <m:sty m:val="p"/>
+                      </m:rPr>
+                      <m:t>median = </m:t>
+                    </m:r>
                     <m:f>
                       <m:fPr>
                         <m:type m:val="bar"/>
@@ -5800,23 +5521,6 @@
                         </m:r>
                       </m:den>
                     </m:f>
-                    <m:r>
-                      <m:rPr>
-                        <m:nor/>
-                        <m:sty m:val="p"/>
-                      </m:rPr>
-                      <m:t> if </m:t>
-                    </m:r>
-                    <m:r>
-                      <m:t>n</m:t>
-                    </m:r>
-                    <m:r>
-                      <m:rPr>
-                        <m:nor/>
-                        <m:sty m:val="p"/>
-                      </m:rPr>
-                      <m:t> even</m:t>
-                    </m:r>
                   </m:oMath>
                 </a14:m>
               </a:p>
@@ -5829,136 +5533,7 @@
 </p:sld>
 </file>
 
-<file path=ppt/slides/slide24.xml><?xml version="1.0" encoding="utf-8"?>
-<p:sld xmlns:a="http://schemas.openxmlformats.org/drawingml/2006/main" xmlns:r="http://schemas.openxmlformats.org/officeDocument/2006/relationships" xmlns:p="http://schemas.openxmlformats.org/presentationml/2006/main">
-  <p:cSld>
-    <p:spTree>
-      <p:nvGrpSpPr>
-        <p:cNvPr id="1" name=""/>
-        <p:cNvGrpSpPr/>
-        <p:nvPr/>
-      </p:nvGrpSpPr>
-      <p:grpSpPr>
-        <a:xfrm>
-          <a:off x="0" y="0"/>
-          <a:ext cx="0" cy="0"/>
-          <a:chOff x="0" y="0"/>
-          <a:chExt cx="0" cy="0"/>
-        </a:xfrm>
-      </p:grpSpPr>
-      <p:sp>
-        <p:nvSpPr>
-          <p:cNvPr id="2" name="Title 1"/>
-          <p:cNvSpPr>
-            <a:spLocks noGrp="1"/>
-          </p:cNvSpPr>
-          <p:nvPr>
-            <p:ph type="title"/>
-          </p:nvPr>
-        </p:nvSpPr>
-        <p:spPr>
-          <a:xfrm>
-            <a:off x="0" y="0"/>
-            <a:ext cx="9144000" cy="582780"/>
-          </a:xfrm>
-        </p:spPr>
-        <p:txBody>
-          <a:bodyPr/>
-          <a:lstStyle/>
-          <a:p>
-            <a:pPr lvl="0" indent="0" marL="0">
-              <a:buNone/>
-            </a:pPr>
-            <a:r>
-              <a:rPr/>
-              <a:t>Lecture 3: Parameters and statistics</a:t>
-            </a:r>
-          </a:p>
-        </p:txBody>
-      </p:sp>
-      <p:pic>
-        <p:nvPicPr>
-          <p:cNvPr descr="images/clipboard-3257239263.png" id="0" name="Picture 1"/>
-          <p:cNvPicPr>
-            <a:picLocks noGrp="1" noChangeAspect="1"/>
-          </p:cNvPicPr>
-          <p:nvPr/>
-        </p:nvPicPr>
-        <p:blipFill>
-          <a:blip r:embed="rId2"/>
-          <a:stretch>
-            <a:fillRect/>
-          </a:stretch>
-        </p:blipFill>
-        <p:spPr bwMode="auto">
-          <a:xfrm>
-            <a:off x="0" y="635000"/>
-            <a:ext cx="9080500" cy="3860800"/>
-          </a:xfrm>
-          <a:prstGeom prst="rect">
-            <a:avLst/>
-          </a:prstGeom>
-          <a:noFill/>
-          <a:ln w="9525">
-            <a:noFill/>
-            <a:headEnd/>
-            <a:tailEnd/>
-          </a:ln>
-        </p:spPr>
-      </p:pic>
-    </p:spTree>
-  </p:cSld>
-</p:sld>
-</file>
-
-<file path=ppt/slides/slide25.xml><?xml version="1.0" encoding="utf-8"?>
-<p:sld xmlns:a="http://schemas.openxmlformats.org/drawingml/2006/main" xmlns:r="http://schemas.openxmlformats.org/officeDocument/2006/relationships" xmlns:p="http://schemas.openxmlformats.org/presentationml/2006/main">
-  <p:cSld>
-    <p:spTree>
-      <p:nvGrpSpPr>
-        <p:cNvPr id="1" name=""/>
-        <p:cNvGrpSpPr/>
-        <p:nvPr/>
-      </p:nvGrpSpPr>
-      <p:grpSpPr>
-        <a:xfrm>
-          <a:off x="0" y="0"/>
-          <a:ext cx="0" cy="0"/>
-          <a:chOff x="0" y="0"/>
-          <a:chExt cx="0" cy="0"/>
-        </a:xfrm>
-      </p:grpSpPr>
-      <p:sp>
-        <p:nvSpPr>
-          <p:cNvPr id="3" name="Content Placeholder 2"/>
-          <p:cNvSpPr>
-            <a:spLocks noGrp="1"/>
-          </p:cNvSpPr>
-          <p:nvPr>
-            <p:ph idx="1"/>
-          </p:nvPr>
-        </p:nvSpPr>
-        <p:spPr/>
-        <p:txBody>
-          <a:bodyPr/>
-          <a:lstStyle/>
-          <a:p>
-            <a:pPr lvl="0" indent="0" marL="0">
-              <a:buNone/>
-            </a:pPr>
-            <a:r>
-              <a:rPr/>
-              <a:t>d</a:t>
-            </a:r>
-          </a:p>
-        </p:txBody>
-      </p:sp>
-    </p:spTree>
-  </p:cSld>
-</p:sld>
-</file>
-
-<file path=ppt/slides/slide26.xml><?xml version="1.0" encoding="utf-8"?>
+<file path=ppt/slides/slide21.xml><?xml version="1.0" encoding="utf-8"?>
 <p:sld xmlns:a="http://schemas.openxmlformats.org/drawingml/2006/main" xmlns:r="http://schemas.openxmlformats.org/officeDocument/2006/relationships" xmlns:p="http://schemas.openxmlformats.org/presentationml/2006/main">
   <p:cSld>
     <p:spTree>
@@ -6225,7 +5800,7 @@
 </p:sld>
 </file>
 
-<file path=ppt/slides/slide27.xml><?xml version="1.0" encoding="utf-8"?>
+<file path=ppt/slides/slide22.xml><?xml version="1.0" encoding="utf-8"?>
 <p:sld xmlns:a="http://schemas.openxmlformats.org/drawingml/2006/main" xmlns:r="http://schemas.openxmlformats.org/officeDocument/2006/relationships" xmlns:p="http://schemas.openxmlformats.org/presentationml/2006/main">
   <p:cSld>
     <p:spTree>
@@ -6357,7 +5932,7 @@
 </p:sld>
 </file>
 
-<file path=ppt/slides/slide28.xml><?xml version="1.0" encoding="utf-8"?>
+<file path=ppt/slides/slide23.xml><?xml version="1.0" encoding="utf-8"?>
 <p:sld xmlns:a="http://schemas.openxmlformats.org/drawingml/2006/main" xmlns:r="http://schemas.openxmlformats.org/officeDocument/2006/relationships" xmlns:p="http://schemas.openxmlformats.org/presentationml/2006/main">
   <p:cSld>
     <p:spTree>
@@ -6502,6 +6077,24 @@
                 </a:pPr>
                 <a14:m>
                   <m:oMath xmlns:m="http://schemas.openxmlformats.org/officeDocument/2006/math">
+                    <m:sSup>
+                      <m:e>
+                        <m:r>
+                          <m:t>s</m:t>
+                        </m:r>
+                      </m:e>
+                      <m:sup>
+                        <m:r>
+                          <m:t>2</m:t>
+                        </m:r>
+                      </m:sup>
+                    </m:sSup>
+                    <m:r>
+                      <m:rPr>
+                        <m:sty m:val="p"/>
+                      </m:rPr>
+                      <m:t>=</m:t>
+                    </m:r>
                     <m:rad>
                       <m:radPr>
                         <m:degHide m:val="on"/>
@@ -6619,6 +6212,19 @@
                 </a:pPr>
                 <a14:m>
                   <m:oMath xmlns:m="http://schemas.openxmlformats.org/officeDocument/2006/math">
+                    <m:r>
+                      <m:rPr>
+                        <m:nor/>
+                        <m:sty m:val="p"/>
+                      </m:rPr>
+                      <m:t>Coefficient of variation</m:t>
+                    </m:r>
+                    <m:r>
+                      <m:rPr>
+                        <m:sty m:val="p"/>
+                      </m:rPr>
+                      <m:t>=</m:t>
+                    </m:r>
                     <m:f>
                       <m:fPr>
                         <m:type m:val="bar"/>
@@ -6642,7 +6248,10 @@
                       </m:den>
                     </m:f>
                     <m:r>
-                      <m:t>X</m:t>
+                      <m:rPr>
+                        <m:sty m:val="p"/>
+                      </m:rPr>
+                      <m:t>×</m:t>
                     </m:r>
                     <m:r>
                       <m:t>100</m:t>
@@ -6659,7 +6268,7 @@
 </p:sld>
 </file>
 
-<file path=ppt/slides/slide29.xml><?xml version="1.0" encoding="utf-8"?>
+<file path=ppt/slides/slide24.xml><?xml version="1.0" encoding="utf-8"?>
 <p:sld xmlns:a="http://schemas.openxmlformats.org/drawingml/2006/main" xmlns:r="http://schemas.openxmlformats.org/officeDocument/2006/relationships" xmlns:p="http://schemas.openxmlformats.org/presentationml/2006/main">
   <p:cSld>
     <p:spTree>
@@ -6777,6 +6386,88 @@
           </a:p>
         </p:txBody>
       </p:sp>
+    </p:spTree>
+  </p:cSld>
+</p:sld>
+</file>
+
+<file path=ppt/slides/slide25.xml><?xml version="1.0" encoding="utf-8"?>
+<p:sld xmlns:a="http://schemas.openxmlformats.org/drawingml/2006/main" xmlns:r="http://schemas.openxmlformats.org/officeDocument/2006/relationships" xmlns:p="http://schemas.openxmlformats.org/presentationml/2006/main">
+  <p:cSld>
+    <p:spTree>
+      <p:nvGrpSpPr>
+        <p:cNvPr id="1" name=""/>
+        <p:cNvGrpSpPr/>
+        <p:nvPr/>
+      </p:nvGrpSpPr>
+      <p:grpSpPr>
+        <a:xfrm>
+          <a:off x="0" y="0"/>
+          <a:ext cx="0" cy="0"/>
+          <a:chOff x="0" y="0"/>
+          <a:chExt cx="0" cy="0"/>
+        </a:xfrm>
+      </p:grpSpPr>
+      <p:sp>
+        <p:nvSpPr>
+          <p:cNvPr id="2" name="Title 1"/>
+          <p:cNvSpPr>
+            <a:spLocks noGrp="1"/>
+          </p:cNvSpPr>
+          <p:nvPr>
+            <p:ph type="title"/>
+          </p:nvPr>
+        </p:nvSpPr>
+        <p:spPr>
+          <a:xfrm>
+            <a:off x="0" y="0"/>
+            <a:ext cx="9144000" cy="582780"/>
+          </a:xfrm>
+        </p:spPr>
+        <p:txBody>
+          <a:bodyPr/>
+          <a:lstStyle/>
+          <a:p>
+            <a:pPr lvl="0" indent="0" marL="0">
+              <a:buNone/>
+            </a:pPr>
+            <a:r>
+              <a:rPr/>
+              <a:t>Lecture 3: Estimation</a:t>
+            </a:r>
+          </a:p>
+        </p:txBody>
+      </p:sp>
+      <p:pic>
+        <p:nvPicPr>
+          <p:cNvPr descr="images/clipboard-536528302.png" id="0" name="Picture 1"/>
+          <p:cNvPicPr>
+            <a:picLocks noGrp="1" noChangeAspect="1"/>
+          </p:cNvPicPr>
+          <p:nvPr/>
+        </p:nvPicPr>
+        <p:blipFill>
+          <a:blip r:embed="rId2"/>
+          <a:stretch>
+            <a:fillRect/>
+          </a:stretch>
+        </p:blipFill>
+        <p:spPr bwMode="auto">
+          <a:xfrm>
+            <a:off x="3187700" y="609600"/>
+            <a:ext cx="2717800" cy="3911600"/>
+          </a:xfrm>
+          <a:prstGeom prst="rect">
+            <a:avLst/>
+          </a:prstGeom>
+          <a:noFill/>
+          <a:ln w="9525">
+            <a:noFill/>
+            <a:headEnd/>
+            <a:tailEnd/>
+          </a:ln>
+        </p:spPr>
+      </p:pic>
     </p:spTree>
   </p:cSld>
 </p:sld>
@@ -6955,88 +6646,6 @@
 </p:sld>
 </file>
 
-<file path=ppt/slides/slide30.xml><?xml version="1.0" encoding="utf-8"?>
-<p:sld xmlns:a="http://schemas.openxmlformats.org/drawingml/2006/main" xmlns:r="http://schemas.openxmlformats.org/officeDocument/2006/relationships" xmlns:p="http://schemas.openxmlformats.org/presentationml/2006/main">
-  <p:cSld>
-    <p:spTree>
-      <p:nvGrpSpPr>
-        <p:cNvPr id="1" name=""/>
-        <p:cNvGrpSpPr/>
-        <p:nvPr/>
-      </p:nvGrpSpPr>
-      <p:grpSpPr>
-        <a:xfrm>
-          <a:off x="0" y="0"/>
-          <a:ext cx="0" cy="0"/>
-          <a:chOff x="0" y="0"/>
-          <a:chExt cx="0" cy="0"/>
-        </a:xfrm>
-      </p:grpSpPr>
-      <p:sp>
-        <p:nvSpPr>
-          <p:cNvPr id="2" name="Title 1"/>
-          <p:cNvSpPr>
-            <a:spLocks noGrp="1"/>
-          </p:cNvSpPr>
-          <p:nvPr>
-            <p:ph type="title"/>
-          </p:nvPr>
-        </p:nvSpPr>
-        <p:spPr>
-          <a:xfrm>
-            <a:off x="0" y="0"/>
-            <a:ext cx="9144000" cy="582780"/>
-          </a:xfrm>
-        </p:spPr>
-        <p:txBody>
-          <a:bodyPr/>
-          <a:lstStyle/>
-          <a:p>
-            <a:pPr lvl="0" indent="0" marL="0">
-              <a:buNone/>
-            </a:pPr>
-            <a:r>
-              <a:rPr/>
-              <a:t>Lecture 3: Estimation</a:t>
-            </a:r>
-          </a:p>
-        </p:txBody>
-      </p:sp>
-      <p:pic>
-        <p:nvPicPr>
-          <p:cNvPr descr="images/clipboard-2695218355.png" id="0" name="Picture 1"/>
-          <p:cNvPicPr>
-            <a:picLocks noGrp="1" noChangeAspect="1"/>
-          </p:cNvPicPr>
-          <p:nvPr/>
-        </p:nvPicPr>
-        <p:blipFill>
-          <a:blip r:embed="rId2"/>
-          <a:stretch>
-            <a:fillRect/>
-          </a:stretch>
-        </p:blipFill>
-        <p:spPr bwMode="auto">
-          <a:xfrm>
-            <a:off x="3022600" y="609600"/>
-            <a:ext cx="3048000" cy="3911600"/>
-          </a:xfrm>
-          <a:prstGeom prst="rect">
-            <a:avLst/>
-          </a:prstGeom>
-          <a:noFill/>
-          <a:ln w="9525">
-            <a:noFill/>
-            <a:headEnd/>
-            <a:tailEnd/>
-          </a:ln>
-        </p:spPr>
-      </p:pic>
-    </p:spTree>
-  </p:cSld>
-</p:sld>
-</file>
-
 <file path=ppt/slides/slide4.xml><?xml version="1.0" encoding="utf-8"?>
 <p:sld xmlns:a="http://schemas.openxmlformats.org/drawingml/2006/main" xmlns:r="http://schemas.openxmlformats.org/officeDocument/2006/relationships" xmlns:p="http://schemas.openxmlformats.org/presentationml/2006/main">
   <p:cSld>
@@ -7129,10 +6738,13 @@
           </a:p>
           <a:p>
             <a:pPr lvl="0" indent="0" marL="0">
+              <a:spcBef>
+                <a:spcPts val="3000"/>
+              </a:spcBef>
               <a:buNone/>
             </a:pPr>
             <a:r>
-              <a:rPr/>
+              <a:rPr b="1"/>
               <a:t>Lake Trout</a:t>
             </a:r>
           </a:p>
@@ -7195,10 +6807,13 @@
           </a:p>
           <a:p>
             <a:pPr lvl="0" indent="0" marL="0">
+              <a:spcBef>
+                <a:spcPts val="3000"/>
+              </a:spcBef>
               <a:buNone/>
             </a:pPr>
             <a:r>
-              <a:rPr/>
+              <a:rPr b="1"/>
               <a:t>Grayling</a:t>
             </a:r>
           </a:p>
@@ -7250,10 +6865,13 @@
           <a:lstStyle/>
           <a:p>
             <a:pPr lvl="0" indent="0" marL="0">
+              <a:spcBef>
+                <a:spcPts val="3000"/>
+              </a:spcBef>
               <a:buNone/>
             </a:pPr>
             <a:r>
-              <a:rPr/>
+              <a:rPr b="1"/>
               <a:t>Slimy Sculpin</a:t>
             </a:r>
           </a:p>
@@ -7962,18 +7580,21 @@
             </a:r>
           </a:p>
           <a:p>
-            <a:pPr lvl="0" indent="0" marL="0">
-              <a:buNone/>
-            </a:pPr>
+            <a:pPr lvl="0"/>
+            <a:r>
+              <a:rPr/>
+              <a:t>Sampls size</a:t>
+            </a:r>
+          </a:p>
+          <a:p>
+            <a:pPr lvl="1"/>
             <a:r>
               <a:rPr/>
               <a:t>Low sample number - 15</a:t>
             </a:r>
           </a:p>
           <a:p>
-            <a:pPr lvl="0" indent="0" marL="0">
-              <a:buNone/>
-            </a:pPr>
+            <a:pPr lvl="1"/>
             <a:r>
               <a:rPr/>
               <a:t>High sample number - 70</a:t>

</xml_diff>